<commit_message>
Fix link to github
</commit_message>
<xml_diff>
--- a/db.pptx
+++ b/db.pptx
@@ -7250,7 +7250,7 @@
           <a:p>
             <a:fld id="{16E5F246-0B7D-44DF-8C1B-EDFCA5DA626A}" type="datetimeFigureOut">
               <a:rPr lang="ru-RU" smtClean="0"/>
-              <a:t>17.02.2019</a:t>
+              <a:t>18.02.2019</a:t>
             </a:fld>
             <a:endParaRPr lang="ru-RU"/>
           </a:p>
@@ -8221,55 +8221,7 @@
                 <a:ea typeface="+mn-ea"/>
                 <a:cs typeface="+mn-cs"/>
               </a:rPr>
-              <a:t>Сейчас обсудим, чем мы будем заниматься. Как говорилось выше, БД - сложная штука внутри. Чтобы хорошо разбираться в устройстве хотя бы нескольких БД, нужны годы опыта. Но очень важно также уметь правильно ими пользоваться. Если отправлять в БД </a:t>
-            </a:r>
-            <a:r>
-              <a:rPr lang="ru-RU" sz="1200" b="0" i="0" u="none" strike="noStrike" kern="1200" dirty="0" smtClean="0">
-                <a:solidFill>
-                  <a:schemeClr val="tx1"/>
-                </a:solidFill>
-                <a:effectLst/>
-                <a:latin typeface="+mn-lt"/>
-                <a:ea typeface="+mn-ea"/>
-                <a:cs typeface="+mn-cs"/>
-              </a:rPr>
-              <a:t>неоптимальные </a:t>
-            </a:r>
-            <a:r>
-              <a:rPr lang="ru-RU" sz="1200" b="0" i="0" u="none" strike="noStrike" kern="1200" dirty="0" smtClean="0">
-                <a:solidFill>
-                  <a:schemeClr val="tx1"/>
-                </a:solidFill>
-                <a:effectLst/>
-                <a:latin typeface="+mn-lt"/>
-                <a:ea typeface="+mn-ea"/>
-                <a:cs typeface="+mn-cs"/>
-              </a:rPr>
-              <a:t>запросы, она будет работать медленно. Если неправильно </a:t>
-            </a:r>
-            <a:r>
-              <a:rPr lang="ru-RU" sz="1200" b="0" i="0" u="none" strike="noStrike" kern="1200" dirty="0" smtClean="0">
-                <a:solidFill>
-                  <a:schemeClr val="tx1"/>
-                </a:solidFill>
-                <a:effectLst/>
-                <a:latin typeface="+mn-lt"/>
-                <a:ea typeface="+mn-ea"/>
-                <a:cs typeface="+mn-cs"/>
-              </a:rPr>
-              <a:t>спроектировать, </a:t>
-            </a:r>
-            <a:r>
-              <a:rPr lang="ru-RU" sz="1200" b="0" i="0" u="none" strike="noStrike" kern="1200" dirty="0" smtClean="0">
-                <a:solidFill>
-                  <a:schemeClr val="tx1"/>
-                </a:solidFill>
-                <a:effectLst/>
-                <a:latin typeface="+mn-lt"/>
-                <a:ea typeface="+mn-ea"/>
-                <a:cs typeface="+mn-cs"/>
-              </a:rPr>
-              <a:t>как уложить ваши данные в БД, можно вообще не решить свою задачу.</a:t>
+              <a:t>Сейчас обсудим, чем мы будем заниматься. Как говорилось выше, БД - сложная штука внутри. Чтобы хорошо разбираться в устройстве хотя бы нескольких БД, нужны годы опыта. Но очень важно также уметь правильно ими пользоваться. Если отправлять в БД неоптимальные запросы, она будет работать медленно. Если неправильно спроектировать, как уложить ваши данные в БД, можно вообще не решить свою задачу.</a:t>
             </a:r>
           </a:p>
           <a:p>
@@ -13769,15 +13721,6 @@
               </a:rPr>
               <a:t>.</a:t>
             </a:r>
-            <a:endParaRPr lang="ru-RU" sz="1200" b="0" i="0" u="none" strike="noStrike" kern="1200" dirty="0" smtClean="0">
-              <a:solidFill>
-                <a:schemeClr val="tx1"/>
-              </a:solidFill>
-              <a:effectLst/>
-              <a:latin typeface="+mn-lt"/>
-              <a:ea typeface="+mn-ea"/>
-              <a:cs typeface="+mn-cs"/>
-            </a:endParaRPr>
           </a:p>
           <a:p>
             <a:pPr rtl="0" fontAlgn="base"/>
@@ -14073,7 +14016,19 @@
                 <a:ea typeface="+mn-ea"/>
                 <a:cs typeface="+mn-cs"/>
               </a:rPr>
-              <a:t>] Нужно найти все бронирования на нужный день и просто достать </a:t>
+              <a:t>] Нужно найти все бронирования на нужный день и просто достать паспорта</a:t>
+            </a:r>
+            <a:r>
+              <a:rPr lang="ru-RU" sz="1200" b="0" i="0" u="none" strike="noStrike" kern="1200" baseline="0" dirty="0" smtClean="0">
+                <a:solidFill>
+                  <a:schemeClr val="tx1"/>
+                </a:solidFill>
+                <a:effectLst/>
+                <a:latin typeface="+mn-lt"/>
+                <a:ea typeface="+mn-ea"/>
+                <a:cs typeface="+mn-cs"/>
+              </a:rPr>
+              <a:t> гостей</a:t>
             </a:r>
             <a:r>
               <a:rPr lang="ru-RU" sz="1200" b="0" i="0" u="none" strike="noStrike" kern="1200" dirty="0" smtClean="0">
@@ -14085,41 +14040,8 @@
                 <a:ea typeface="+mn-ea"/>
                 <a:cs typeface="+mn-cs"/>
               </a:rPr>
-              <a:t>паспорта</a:t>
-            </a:r>
-            <a:r>
-              <a:rPr lang="ru-RU" sz="1200" b="0" i="0" u="none" strike="noStrike" kern="1200" baseline="0" dirty="0" smtClean="0">
-                <a:solidFill>
-                  <a:schemeClr val="tx1"/>
-                </a:solidFill>
-                <a:effectLst/>
-                <a:latin typeface="+mn-lt"/>
-                <a:ea typeface="+mn-ea"/>
-                <a:cs typeface="+mn-cs"/>
-              </a:rPr>
-              <a:t> гостей</a:t>
-            </a:r>
-            <a:r>
-              <a:rPr lang="ru-RU" sz="1200" b="0" i="0" u="none" strike="noStrike" kern="1200" dirty="0" smtClean="0">
-                <a:solidFill>
-                  <a:schemeClr val="tx1"/>
-                </a:solidFill>
-                <a:effectLst/>
-                <a:latin typeface="+mn-lt"/>
-                <a:ea typeface="+mn-ea"/>
-                <a:cs typeface="+mn-cs"/>
-              </a:rPr>
               <a:t>.</a:t>
             </a:r>
-            <a:endParaRPr lang="ru-RU" sz="1200" b="0" i="0" u="none" strike="noStrike" kern="1200" dirty="0" smtClean="0">
-              <a:solidFill>
-                <a:schemeClr val="tx1"/>
-              </a:solidFill>
-              <a:effectLst/>
-              <a:latin typeface="+mn-lt"/>
-              <a:ea typeface="+mn-ea"/>
-              <a:cs typeface="+mn-cs"/>
-            </a:endParaRPr>
           </a:p>
           <a:p>
             <a:pPr rtl="0" fontAlgn="base"/>
@@ -15736,11 +15658,7 @@
           <a:p>
             <a:r>
               <a:rPr lang="ru-RU" dirty="0" smtClean="0"/>
-              <a:t>Все </a:t>
-            </a:r>
-            <a:r>
-              <a:rPr lang="ru-RU" dirty="0" smtClean="0"/>
-              <a:t>они разные и заточены под свои цели. И различие можно проводить по совершенно разным измерениям.</a:t>
+              <a:t>Все они разные и заточены под свои цели. И различие можно проводить по совершенно разным измерениям.</a:t>
             </a:r>
             <a:endParaRPr lang="ru-RU" dirty="0"/>
           </a:p>
@@ -16542,11 +16460,7 @@
             </a:r>
             <a:r>
               <a:rPr lang="ru-RU" baseline="0" dirty="0" smtClean="0"/>
-              <a:t> </a:t>
-            </a:r>
-            <a:r>
-              <a:rPr lang="ru-RU" baseline="0" dirty="0" smtClean="0"/>
-              <a:t>эти имена пришли из SQL. Но реляционная модель оказалась не очень подходящей для века, когда нужны большие нагрузки и много-много данных. Эту нишу начали заполнять так называемые </a:t>
+              <a:t> эти имена пришли из SQL. Но реляционная модель оказалась не очень подходящей для века, когда нужны большие нагрузки и много-много данных. Эту нишу начали заполнять так называемые </a:t>
             </a:r>
             <a:r>
               <a:rPr lang="ru-RU" baseline="0" dirty="0" err="1" smtClean="0"/>
@@ -16603,11 +16517,7 @@
             </a:r>
             <a:r>
               <a:rPr lang="ru-RU" baseline="0" dirty="0" smtClean="0"/>
-              <a:t> SQL</a:t>
-            </a:r>
-            <a:r>
-              <a:rPr lang="ru-RU" baseline="0" dirty="0" smtClean="0"/>
-              <a:t>»</a:t>
+              <a:t> SQL»</a:t>
             </a:r>
             <a:r>
               <a:rPr lang="en-US" baseline="0" dirty="0" smtClean="0"/>
@@ -16623,11 +16533,7 @@
             </a:r>
             <a:r>
               <a:rPr lang="ru-RU" baseline="0" dirty="0" smtClean="0"/>
-              <a:t>-ем единым»! </a:t>
-            </a:r>
-            <a:r>
-              <a:rPr lang="ru-RU" baseline="0" dirty="0" smtClean="0"/>
-              <a:t>Если следовать определению из Википедии, то: </a:t>
+              <a:t>-ем единым»! Если следовать определению из Википедии, то: </a:t>
             </a:r>
             <a:r>
               <a:rPr lang="en-US" baseline="0" dirty="0" smtClean="0"/>
@@ -16635,15 +16541,7 @@
             </a:r>
             <a:r>
               <a:rPr lang="ru-RU" baseline="0" dirty="0" smtClean="0"/>
-              <a:t> термин, обозначающий ряд подходов, направленных на реализацию хранилищ баз данных, имеющих существенные отличия от моделей, используемых в традиционных реляционных СУБД. Применяется к базам данных, в которых делается попытка решить проблемы масштабируемости и доступности за счёт </a:t>
-            </a:r>
-            <a:r>
-              <a:rPr lang="ru-RU" baseline="0" dirty="0" smtClean="0"/>
-              <a:t>жертв гарантий атомарности </a:t>
-            </a:r>
-            <a:r>
-              <a:rPr lang="ru-RU" baseline="0" dirty="0" smtClean="0"/>
-              <a:t>(англ. </a:t>
+              <a:t> термин, обозначающий ряд подходов, направленных на реализацию хранилищ баз данных, имеющих существенные отличия от моделей, используемых в традиционных реляционных СУБД. Применяется к базам данных, в которых делается попытка решить проблемы масштабируемости и доступности за счёт жертв гарантий атомарности (англ. </a:t>
             </a:r>
             <a:r>
               <a:rPr lang="ru-RU" baseline="0" dirty="0" err="1" smtClean="0"/>
@@ -16651,15 +16549,7 @@
             </a:r>
             <a:r>
               <a:rPr lang="ru-RU" baseline="0" dirty="0" smtClean="0"/>
-              <a:t>) и </a:t>
-            </a:r>
-            <a:r>
-              <a:rPr lang="ru-RU" baseline="0" dirty="0" smtClean="0"/>
-              <a:t>согласованности </a:t>
-            </a:r>
-            <a:r>
-              <a:rPr lang="ru-RU" baseline="0" dirty="0" smtClean="0"/>
-              <a:t>данных (англ. </a:t>
+              <a:t>) и согласованности данных (англ. </a:t>
             </a:r>
             <a:r>
               <a:rPr lang="ru-RU" baseline="0" dirty="0" err="1" smtClean="0"/>
@@ -16684,11 +16574,7 @@
             </a:r>
             <a:r>
               <a:rPr lang="ru-RU" baseline="0" dirty="0" smtClean="0"/>
-              <a:t>базы данных широко используются по всему миру. Мы в нашем курсе </a:t>
-            </a:r>
-            <a:r>
-              <a:rPr lang="ru-RU" baseline="0" dirty="0" smtClean="0"/>
-              <a:t>будем работать с одним конкретным типом </a:t>
+              <a:t>базы данных широко используются по всему миру. Мы в нашем курсе будем работать с одним конкретным типом </a:t>
             </a:r>
             <a:r>
               <a:rPr lang="en-US" baseline="0" dirty="0" smtClean="0"/>
@@ -16721,11 +16607,7 @@
             </a:pPr>
             <a:r>
               <a:rPr lang="ru-RU" baseline="0" dirty="0" smtClean="0"/>
-              <a:t>Они интуитивно понятны. Не нужно вникать в реляционную алгебру, чтобы хранить данные. </a:t>
-            </a:r>
-            <a:r>
-              <a:rPr lang="ru-RU" baseline="0" dirty="0" smtClean="0"/>
-              <a:t>Документные базы</a:t>
+              <a:t>Они интуитивно понятны. Не нужно вникать в реляционную алгебру, чтобы хранить данные. Документные базы</a:t>
             </a:r>
             <a:r>
               <a:rPr lang="en-US" baseline="0" dirty="0" smtClean="0"/>
@@ -16742,11 +16624,7 @@
             </a:pPr>
             <a:r>
               <a:rPr lang="ru-RU" baseline="0" dirty="0" smtClean="0"/>
-              <a:t>Реляционные БД </a:t>
-            </a:r>
-            <a:r>
-              <a:rPr lang="ru-RU" baseline="0" dirty="0" smtClean="0"/>
-              <a:t>(</a:t>
+              <a:t>Реляционные БД (</a:t>
             </a:r>
             <a:r>
               <a:rPr lang="en-US" baseline="0" dirty="0" smtClean="0"/>
@@ -16762,13 +16640,8 @@
             </a:r>
             <a:r>
               <a:rPr lang="ru-RU" baseline="0" dirty="0" smtClean="0"/>
-              <a:t>обычно в каком-то виде рассматриваются на традиционных курсах по БД в </a:t>
-            </a:r>
-            <a:r>
-              <a:rPr lang="ru-RU" baseline="0" dirty="0" smtClean="0"/>
-              <a:t>университете.</a:t>
-            </a:r>
-            <a:endParaRPr lang="ru-RU" baseline="0" dirty="0" smtClean="0"/>
+              <a:t>обычно в каком-то виде рассматриваются на традиционных курсах по БД в университете.</a:t>
+            </a:r>
           </a:p>
           <a:p>
             <a:endParaRPr lang="ru-RU" baseline="0" dirty="0" smtClean="0"/>
@@ -20870,7 +20743,19 @@
           <a:p>
             <a:r>
               <a:rPr lang="ru-RU" dirty="0" smtClean="0"/>
-              <a:t>Проектирование структуры Базы данных</a:t>
+              <a:t>Проектирование структуры </a:t>
+            </a:r>
+            <a:r>
+              <a:rPr lang="ru-RU" dirty="0" smtClean="0"/>
+              <a:t>Базы</a:t>
+            </a:r>
+            <a:r>
+              <a:rPr lang="en-US" dirty="0" smtClean="0"/>
+              <a:t> </a:t>
+            </a:r>
+            <a:r>
+              <a:rPr lang="ru-RU" dirty="0" smtClean="0"/>
+              <a:t>данных</a:t>
             </a:r>
             <a:endParaRPr lang="en-US" dirty="0"/>
           </a:p>
@@ -20901,19 +20786,11 @@
               <a:rPr lang="en-US" dirty="0" smtClean="0">
                 <a:hlinkClick r:id="rId3"/>
               </a:rPr>
-              <a:t>github.com/</a:t>
-            </a:r>
-            <a:r>
-              <a:rPr lang="en-US" dirty="0" smtClean="0">
-                <a:hlinkClick r:id="rId4"/>
-              </a:rPr>
-              <a:t>kontur-courses</a:t>
-            </a:r>
-            <a:r>
-              <a:rPr lang="en-US" dirty="0" smtClean="0">
-                <a:hlinkClick r:id="rId3"/>
-              </a:rPr>
-              <a:t>/db</a:t>
+              <a:t>github.com/kontur-courses/web-game</a:t>
+            </a:r>
+            <a:r>
+              <a:rPr lang="en-US" dirty="0" smtClean="0"/>
+              <a:t> </a:t>
             </a:r>
             <a:endParaRPr lang="en-US" b="1" dirty="0" smtClean="0"/>
           </a:p>
@@ -20931,7 +20808,7 @@
           <p:nvPr/>
         </p:nvPicPr>
         <p:blipFill>
-          <a:blip r:embed="rId5" cstate="print">
+          <a:blip r:embed="rId4" cstate="print">
             <a:extLst>
               <a:ext uri="{28A0092B-C50C-407E-A947-70E740481C1C}">
                 <a14:useLocalDpi xmlns:a14="http://schemas.microsoft.com/office/drawing/2010/main" val="0"/>
@@ -21011,11 +20888,7 @@
           <a:p>
             <a:r>
               <a:rPr lang="ru-RU" dirty="0" smtClean="0"/>
-              <a:t>1. </a:t>
-            </a:r>
-            <a:r>
-              <a:rPr lang="ru-RU" dirty="0" smtClean="0"/>
-              <a:t>Данные </a:t>
+              <a:t>1. Данные </a:t>
             </a:r>
             <a:r>
               <a:rPr lang="ru-RU" dirty="0"/>
@@ -21116,11 +20989,7 @@
             <a:pPr fontAlgn="base"/>
             <a:r>
               <a:rPr lang="ru-RU" dirty="0" smtClean="0"/>
-              <a:t>2. </a:t>
-            </a:r>
-            <a:r>
-              <a:rPr lang="ru-RU" dirty="0" smtClean="0"/>
-              <a:t>Данные </a:t>
+              <a:t>2. Данные </a:t>
             </a:r>
             <a:r>
               <a:rPr lang="ru-RU" dirty="0"/>
@@ -21151,15 +21020,7 @@
             </a:r>
             <a:r>
               <a:rPr lang="ru-RU" dirty="0" smtClean="0"/>
-              <a:t>не </a:t>
-            </a:r>
-            <a:r>
-              <a:rPr lang="ru-RU" dirty="0" smtClean="0"/>
-              <a:t>сохранить </a:t>
-            </a:r>
-            <a:r>
-              <a:rPr lang="ru-RU" dirty="0" smtClean="0"/>
-              <a:t>данные</a:t>
+              <a:t>не сохранить данные</a:t>
             </a:r>
             <a:endParaRPr lang="ru-RU" dirty="0"/>
           </a:p>
@@ -21262,11 +21123,7 @@
             <a:pPr fontAlgn="base"/>
             <a:r>
               <a:rPr lang="ru-RU" dirty="0" smtClean="0"/>
-              <a:t>3. </a:t>
-            </a:r>
-            <a:r>
-              <a:rPr lang="ru-RU" dirty="0" smtClean="0"/>
-              <a:t>Распределенная БД </a:t>
+              <a:t>3. Распределенная БД </a:t>
             </a:r>
             <a:r>
               <a:rPr lang="ru-RU" dirty="0"/>
@@ -21464,11 +21321,7 @@
             </a:pPr>
             <a:r>
               <a:rPr lang="ru-RU" dirty="0" smtClean="0"/>
-              <a:t>Д</a:t>
-            </a:r>
-            <a:r>
-              <a:rPr lang="ru-RU" dirty="0" smtClean="0"/>
-              <a:t>анные </a:t>
+              <a:t>Данные </a:t>
             </a:r>
             <a:r>
               <a:rPr lang="ru-RU" dirty="0"/>
@@ -21736,7 +21589,6 @@
               <a:rPr lang="ru-RU" dirty="0" smtClean="0"/>
               <a:t>О чём поговорим:</a:t>
             </a:r>
-            <a:endParaRPr lang="ru-RU" dirty="0" smtClean="0"/>
           </a:p>
           <a:p>
             <a:pPr marL="457200" indent="-457200">
@@ -22577,6 +22429,13 @@
   <p:clrMapOvr>
     <a:masterClrMapping/>
   </p:clrMapOvr>
+  <p:timing>
+    <p:tnLst>
+      <p:par>
+        <p:cTn id="1" dur="indefinite" restart="never" nodeType="tmRoot"/>
+      </p:par>
+    </p:tnLst>
+  </p:timing>
 </p:sld>
 </file>
 
@@ -25224,7 +25083,6 @@
               <a:rPr lang="en-US" dirty="0" smtClean="0"/>
               <a:t>Messages:</a:t>
             </a:r>
-            <a:endParaRPr lang="en-US" dirty="0" smtClean="0"/>
           </a:p>
           <a:p>
             <a:pPr marL="1200095" lvl="1" indent="-457200"/>
@@ -25569,11 +25427,7 @@
           <a:p>
             <a:r>
               <a:rPr lang="ru-RU" dirty="0" smtClean="0"/>
-              <a:t>Идеально, если поиски будут происходить </a:t>
-            </a:r>
-            <a:r>
-              <a:rPr lang="ru-RU" dirty="0" smtClean="0"/>
-              <a:t>по</a:t>
+              <a:t>Идеально, если поиски будут происходить по</a:t>
             </a:r>
             <a:r>
               <a:rPr lang="en-US" dirty="0" smtClean="0"/>
@@ -25581,11 +25435,7 @@
             </a:r>
             <a:r>
               <a:rPr lang="ru-RU" dirty="0" smtClean="0"/>
-              <a:t>точечному</a:t>
-            </a:r>
-            <a:r>
-              <a:rPr lang="ru-RU" dirty="0" smtClean="0"/>
-              <a:t>, известному ключу.</a:t>
+              <a:t>точечному, известному ключу.</a:t>
             </a:r>
             <a:endParaRPr lang="ru-RU" dirty="0"/>
           </a:p>
@@ -25705,11 +25555,7 @@
             </a:pPr>
             <a:r>
               <a:rPr lang="ru-RU" dirty="0" smtClean="0"/>
-              <a:t>А где можно просто отфильтровать, опираясь на знание природы данных и сэкономить </a:t>
-            </a:r>
-            <a:r>
-              <a:rPr lang="ru-RU" dirty="0" smtClean="0"/>
-              <a:t>на</a:t>
+              <a:t>А где можно просто отфильтровать, опираясь на знание природы данных и сэкономить на</a:t>
             </a:r>
             <a:r>
               <a:rPr lang="en-US" dirty="0" smtClean="0"/>
@@ -25809,15 +25655,7 @@
                   <a:schemeClr val="accent1"/>
                 </a:solidFill>
               </a:rPr>
-              <a:t>Выбор самой БД</a:t>
-            </a:r>
-            <a:r>
-              <a:rPr lang="ru-RU" dirty="0" smtClean="0">
-                <a:solidFill>
-                  <a:schemeClr val="accent1"/>
-                </a:solidFill>
-              </a:rPr>
-              <a:t>:</a:t>
+              <a:t>Выбор самой БД:</a:t>
             </a:r>
             <a:endParaRPr lang="en-US" dirty="0" smtClean="0">
               <a:solidFill>
@@ -26567,25 +26405,13 @@
               <a:rPr lang="en-US" sz="1800" dirty="0">
                 <a:latin typeface="Consolas" panose="020B0609020204030204" pitchFamily="49" charset="0"/>
               </a:rPr>
-              <a:t> </a:t>
-            </a:r>
-            <a:r>
-              <a:rPr lang="en-US" sz="1800" dirty="0">
-                <a:latin typeface="Consolas" panose="020B0609020204030204" pitchFamily="49" charset="0"/>
-              </a:rPr>
-              <a:t>g</a:t>
+              <a:t> g</a:t>
             </a:r>
             <a:r>
               <a:rPr lang="en-US" sz="1800" dirty="0" smtClean="0">
                 <a:latin typeface="Consolas" panose="020B0609020204030204" pitchFamily="49" charset="0"/>
               </a:rPr>
-              <a:t>uests</a:t>
-            </a:r>
-            <a:r>
-              <a:rPr lang="en-US" sz="1800" dirty="0" smtClean="0">
-                <a:latin typeface="Consolas" panose="020B0609020204030204" pitchFamily="49" charset="0"/>
-              </a:rPr>
-              <a:t>);</a:t>
+              <a:t>uests);</a:t>
             </a:r>
             <a:endParaRPr lang="en-US" sz="1800" dirty="0">
               <a:latin typeface="Consolas" panose="020B0609020204030204" pitchFamily="49" charset="0"/>
@@ -27037,17 +26863,8 @@
             </a:pPr>
             <a:r>
               <a:rPr lang="ru-RU" dirty="0" smtClean="0"/>
-              <a:t>Описываем </a:t>
-            </a:r>
-            <a:r>
-              <a:rPr lang="ru-RU" dirty="0" smtClean="0"/>
-              <a:t>коллекцию как набор </a:t>
-            </a:r>
-            <a:r>
-              <a:rPr lang="ru-RU" dirty="0" smtClean="0"/>
-              <a:t>полей.</a:t>
-            </a:r>
-            <a:endParaRPr lang="ru-RU" dirty="0" smtClean="0"/>
+              <a:t>Описываем коллекцию как набор полей.</a:t>
+            </a:r>
           </a:p>
           <a:p>
             <a:pPr marL="457200" indent="-457200">
@@ -27056,13 +26873,8 @@
             </a:pPr>
             <a:r>
               <a:rPr lang="ru-RU" dirty="0" smtClean="0"/>
-              <a:t>Если над полем надо построить индекс, явно пишем об этом в колонке атрибутов </a:t>
-            </a:r>
-            <a:r>
-              <a:rPr lang="ru-RU" dirty="0" smtClean="0"/>
-              <a:t>поля.</a:t>
-            </a:r>
-            <a:endParaRPr lang="ru-RU" dirty="0" smtClean="0"/>
+              <a:t>Если над полем надо построить индекс, явно пишем об этом в колонке атрибутов поля.</a:t>
+            </a:r>
           </a:p>
           <a:p>
             <a:pPr marL="457200" indent="-457200">
@@ -27071,11 +26883,7 @@
             </a:pPr>
             <a:r>
               <a:rPr lang="ru-RU" dirty="0" smtClean="0"/>
-              <a:t>Указываем, какой </a:t>
-            </a:r>
-            <a:r>
-              <a:rPr lang="ru-RU" dirty="0" smtClean="0"/>
-              <a:t>индекс: </a:t>
+              <a:t>Указываем, какой индекс: </a:t>
             </a:r>
             <a:r>
               <a:rPr lang="en-US" dirty="0" smtClean="0"/>
@@ -27096,7 +26904,6 @@
               <a:rPr lang="ru-RU" dirty="0" smtClean="0"/>
               <a:t>Отмечаем поле для первичного ключа.</a:t>
             </a:r>
-            <a:endParaRPr lang="ru-RU" dirty="0" smtClean="0"/>
           </a:p>
           <a:p>
             <a:pPr marL="457200" indent="-457200">
@@ -27107,20 +26914,12 @@
               <a:rPr lang="ru-RU" dirty="0" smtClean="0"/>
               <a:t>Запросы описываем словами. </a:t>
             </a:r>
-            <a:r>
-              <a:rPr lang="ru-RU" dirty="0" smtClean="0"/>
-              <a:t/>
-            </a:r>
             <a:br>
               <a:rPr lang="ru-RU" dirty="0" smtClean="0"/>
             </a:br>
             <a:r>
               <a:rPr lang="ru-RU" dirty="0" smtClean="0"/>
-              <a:t>Коротко </a:t>
-            </a:r>
-            <a:r>
-              <a:rPr lang="ru-RU" dirty="0" smtClean="0"/>
-              <a:t>и ясно, как и где происходит запрос.</a:t>
+              <a:t>Коротко и ясно, как и где происходит запрос.</a:t>
             </a:r>
             <a:endParaRPr lang="ru-RU" dirty="0"/>
           </a:p>
@@ -27143,11 +26942,7 @@
           <a:p>
             <a:r>
               <a:rPr lang="ru-RU" dirty="0" smtClean="0"/>
-              <a:t>Как </a:t>
-            </a:r>
-            <a:r>
-              <a:rPr lang="ru-RU" dirty="0" smtClean="0"/>
-              <a:t>Проектировать БД?</a:t>
+              <a:t>Как Проектировать БД?</a:t>
             </a:r>
             <a:endParaRPr lang="ru-RU" dirty="0"/>
           </a:p>
@@ -28088,11 +27883,7 @@
           <a:p>
             <a:r>
               <a:rPr lang="ru-RU" dirty="0" smtClean="0"/>
-              <a:t>Задача: Бронирование </a:t>
-            </a:r>
-            <a:r>
-              <a:rPr lang="ru-RU" dirty="0" smtClean="0"/>
-              <a:t>комнат</a:t>
+              <a:t>Задача: Бронирование комнат</a:t>
             </a:r>
             <a:endParaRPr lang="ru-RU" dirty="0"/>
           </a:p>
@@ -30062,15 +29853,7 @@
             </a:r>
             <a:r>
               <a:rPr lang="ru-RU" dirty="0" smtClean="0"/>
-              <a:t> </a:t>
-            </a:r>
-            <a:r>
-              <a:rPr lang="ru-RU" dirty="0" smtClean="0"/>
-              <a:t>масштабирование </a:t>
-            </a:r>
-            <a:r>
-              <a:rPr lang="ru-RU" dirty="0" smtClean="0"/>
-              <a:t>на</a:t>
+              <a:t> масштабирование на</a:t>
             </a:r>
             <a:r>
               <a:rPr lang="en-US" dirty="0" smtClean="0"/>
@@ -30078,11 +29861,7 @@
             </a:r>
             <a:r>
               <a:rPr lang="ru-RU" dirty="0" smtClean="0"/>
-              <a:t>много </a:t>
-            </a:r>
-            <a:r>
-              <a:rPr lang="ru-RU" dirty="0" smtClean="0"/>
-              <a:t>машин.</a:t>
+              <a:t>много машин.</a:t>
             </a:r>
           </a:p>
           <a:p>
@@ -30100,11 +29879,7 @@
             </a:r>
             <a:r>
               <a:rPr lang="ru-RU" dirty="0" smtClean="0"/>
-              <a:t> </a:t>
-            </a:r>
-            <a:r>
-              <a:rPr lang="ru-RU" dirty="0" smtClean="0"/>
-              <a:t>работают в </a:t>
+              <a:t> работают в </a:t>
             </a:r>
             <a:r>
               <a:rPr lang="ru-RU" dirty="0"/>

</xml_diff>